<commit_message>
vite: typos in slides
</commit_message>
<xml_diff>
--- a/03-bundling/06-vite/00-teoría/Introducción a vite.pptx
+++ b/03-bundling/06-vite/00-teoría/Introducción a vite.pptx
@@ -2795,27 +2795,7 @@
                 <a:effectLst/>
                 <a:latin typeface="-apple-system"/>
               </a:rPr>
-              <a:t>, que ya vienen </a:t>
-            </a:r>
-            <a:r>
-              <a:rPr lang="es-ES" b="0" i="0" dirty="0" err="1">
-                <a:solidFill>
-                  <a:srgbClr val="D4D4D4"/>
-                </a:solidFill>
-                <a:effectLst/>
-                <a:latin typeface="-apple-system"/>
-              </a:rPr>
-              <a:t>transpilados</a:t>
-            </a:r>
-            <a:r>
-              <a:rPr lang="es-ES" b="0" i="0" dirty="0">
-                <a:solidFill>
-                  <a:srgbClr val="D4D4D4"/>
-                </a:solidFill>
-                <a:effectLst/>
-                <a:latin typeface="-apple-system"/>
-              </a:rPr>
-              <a:t> en </a:t>
+              <a:t>, que ya vienen transpilados en </a:t>
             </a:r>
             <a:r>
               <a:rPr lang="es-ES" b="0" i="0" dirty="0" err="1">
@@ -7153,7 +7133,7 @@
           </a:ln>
           <a:extLst>
             <a:ext uri="{C572A759-6A51-4108-AA02-DFA0A04FC94B}">
-              <ma14:wrappingTextBoxFlag xmlns="" xmlns:m="http://schemas.openxmlformats.org/officeDocument/2006/math" xmlns:a14="http://schemas.microsoft.com/office/drawing/2010/main" xmlns:ma14="http://schemas.microsoft.com/office/mac/drawingml/2011/main" val="1"/>
+              <ma14:wrappingTextBoxFlag xmlns:ma14="http://schemas.microsoft.com/office/mac/drawingml/2011/main" xmlns:a14="http://schemas.microsoft.com/office/drawing/2010/main" xmlns:m="http://schemas.openxmlformats.org/officeDocument/2006/math" xmlns="" val="1"/>
             </a:ext>
           </a:extLst>
         </p:spPr>
@@ -7192,7 +7172,7 @@
           </a:ln>
           <a:extLst>
             <a:ext uri="{C572A759-6A51-4108-AA02-DFA0A04FC94B}">
-              <ma14:wrappingTextBoxFlag xmlns="" xmlns:m="http://schemas.openxmlformats.org/officeDocument/2006/math" xmlns:a14="http://schemas.microsoft.com/office/drawing/2010/main" xmlns:ma14="http://schemas.microsoft.com/office/mac/drawingml/2011/main" val="1"/>
+              <ma14:wrappingTextBoxFlag xmlns:ma14="http://schemas.microsoft.com/office/mac/drawingml/2011/main" xmlns:a14="http://schemas.microsoft.com/office/drawing/2010/main" xmlns:m="http://schemas.openxmlformats.org/officeDocument/2006/math" xmlns="" val="1"/>
             </a:ext>
           </a:extLst>
         </p:spPr>
@@ -8150,7 +8130,7 @@
           </a:ln>
           <a:extLst>
             <a:ext uri="{C572A759-6A51-4108-AA02-DFA0A04FC94B}">
-              <ma14:wrappingTextBoxFlag xmlns="" xmlns:m="http://schemas.openxmlformats.org/officeDocument/2006/math" xmlns:a14="http://schemas.microsoft.com/office/drawing/2010/main" xmlns:ma14="http://schemas.microsoft.com/office/mac/drawingml/2011/main" val="1"/>
+              <ma14:wrappingTextBoxFlag xmlns:ma14="http://schemas.microsoft.com/office/mac/drawingml/2011/main" xmlns:a14="http://schemas.microsoft.com/office/drawing/2010/main" xmlns:m="http://schemas.openxmlformats.org/officeDocument/2006/math" xmlns="" val="1"/>
             </a:ext>
           </a:extLst>
         </p:spPr>
@@ -8202,7 +8182,7 @@
           </a:ln>
           <a:extLst>
             <a:ext uri="{C572A759-6A51-4108-AA02-DFA0A04FC94B}">
-              <ma14:wrappingTextBoxFlag xmlns="" xmlns:m="http://schemas.openxmlformats.org/officeDocument/2006/math" xmlns:a14="http://schemas.microsoft.com/office/drawing/2010/main" xmlns:ma14="http://schemas.microsoft.com/office/mac/drawingml/2011/main" val="1"/>
+              <ma14:wrappingTextBoxFlag xmlns:ma14="http://schemas.microsoft.com/office/mac/drawingml/2011/main" xmlns:a14="http://schemas.microsoft.com/office/drawing/2010/main" xmlns:m="http://schemas.openxmlformats.org/officeDocument/2006/math" xmlns="" val="1"/>
             </a:ext>
           </a:extLst>
         </p:spPr>
@@ -8366,7 +8346,7 @@
           </a:ln>
           <a:extLst>
             <a:ext uri="{C572A759-6A51-4108-AA02-DFA0A04FC94B}">
-              <ma14:wrappingTextBoxFlag xmlns="" xmlns:m="http://schemas.openxmlformats.org/officeDocument/2006/math" xmlns:a14="http://schemas.microsoft.com/office/drawing/2010/main" xmlns:ma14="http://schemas.microsoft.com/office/mac/drawingml/2011/main" val="1"/>
+              <ma14:wrappingTextBoxFlag xmlns:ma14="http://schemas.microsoft.com/office/mac/drawingml/2011/main" xmlns:a14="http://schemas.microsoft.com/office/drawing/2010/main" xmlns:m="http://schemas.openxmlformats.org/officeDocument/2006/math" xmlns="" val="1"/>
             </a:ext>
           </a:extLst>
         </p:spPr>
@@ -8639,7 +8619,7 @@
             <a:effectLst/>
             <a:extLst>
               <a:ext uri="{C572A759-6A51-4108-AA02-DFA0A04FC94B}">
-                <ma14:wrappingTextBoxFlag xmlns="" xmlns:m="http://schemas.openxmlformats.org/officeDocument/2006/math" xmlns:a14="http://schemas.microsoft.com/office/drawing/2010/main" xmlns:ma14="http://schemas.microsoft.com/office/mac/drawingml/2011/main" val="1"/>
+                <ma14:wrappingTextBoxFlag xmlns:ma14="http://schemas.microsoft.com/office/mac/drawingml/2011/main" xmlns:a14="http://schemas.microsoft.com/office/drawing/2010/main" xmlns:m="http://schemas.openxmlformats.org/officeDocument/2006/math" xmlns="" val="1"/>
               </a:ext>
             </a:extLst>
           </p:spPr>
@@ -8689,7 +8669,7 @@
             <a:effectLst/>
             <a:extLst>
               <a:ext uri="{C572A759-6A51-4108-AA02-DFA0A04FC94B}">
-                <ma14:wrappingTextBoxFlag xmlns="" xmlns:m="http://schemas.openxmlformats.org/officeDocument/2006/math" xmlns:a14="http://schemas.microsoft.com/office/drawing/2010/main" xmlns:ma14="http://schemas.microsoft.com/office/mac/drawingml/2011/main" val="1"/>
+                <ma14:wrappingTextBoxFlag xmlns:ma14="http://schemas.microsoft.com/office/mac/drawingml/2011/main" xmlns:a14="http://schemas.microsoft.com/office/drawing/2010/main" xmlns:m="http://schemas.openxmlformats.org/officeDocument/2006/math" xmlns="" val="1"/>
               </a:ext>
             </a:extLst>
           </p:spPr>
@@ -8739,7 +8719,7 @@
             <a:effectLst/>
             <a:extLst>
               <a:ext uri="{C572A759-6A51-4108-AA02-DFA0A04FC94B}">
-                <ma14:wrappingTextBoxFlag xmlns="" xmlns:m="http://schemas.openxmlformats.org/officeDocument/2006/math" xmlns:a14="http://schemas.microsoft.com/office/drawing/2010/main" xmlns:ma14="http://schemas.microsoft.com/office/mac/drawingml/2011/main" val="1"/>
+                <ma14:wrappingTextBoxFlag xmlns:ma14="http://schemas.microsoft.com/office/mac/drawingml/2011/main" xmlns:a14="http://schemas.microsoft.com/office/drawing/2010/main" xmlns:m="http://schemas.openxmlformats.org/officeDocument/2006/math" xmlns="" val="1"/>
               </a:ext>
             </a:extLst>
           </p:spPr>
@@ -8789,7 +8769,7 @@
             <a:effectLst/>
             <a:extLst>
               <a:ext uri="{C572A759-6A51-4108-AA02-DFA0A04FC94B}">
-                <ma14:wrappingTextBoxFlag xmlns="" xmlns:m="http://schemas.openxmlformats.org/officeDocument/2006/math" xmlns:a14="http://schemas.microsoft.com/office/drawing/2010/main" xmlns:ma14="http://schemas.microsoft.com/office/mac/drawingml/2011/main" val="1"/>
+                <ma14:wrappingTextBoxFlag xmlns:ma14="http://schemas.microsoft.com/office/mac/drawingml/2011/main" xmlns:a14="http://schemas.microsoft.com/office/drawing/2010/main" xmlns:m="http://schemas.openxmlformats.org/officeDocument/2006/math" xmlns="" val="1"/>
               </a:ext>
             </a:extLst>
           </p:spPr>
@@ -9900,7 +9880,7 @@
           <a:effectLst/>
           <a:extLst>
             <a:ext uri="{C572A759-6A51-4108-AA02-DFA0A04FC94B}">
-              <ma14:wrappingTextBoxFlag xmlns="" xmlns:m="http://schemas.openxmlformats.org/officeDocument/2006/math" xmlns:a14="http://schemas.microsoft.com/office/drawing/2010/main" xmlns:ma14="http://schemas.microsoft.com/office/mac/drawingml/2011/main" val="1"/>
+              <ma14:wrappingTextBoxFlag xmlns:ma14="http://schemas.microsoft.com/office/mac/drawingml/2011/main" xmlns:a14="http://schemas.microsoft.com/office/drawing/2010/main" xmlns:m="http://schemas.openxmlformats.org/officeDocument/2006/math" xmlns="" val="1"/>
             </a:ext>
           </a:extLst>
         </p:spPr>
@@ -9960,7 +9940,7 @@
           <a:effectLst/>
           <a:extLst>
             <a:ext uri="{C572A759-6A51-4108-AA02-DFA0A04FC94B}">
-              <ma14:wrappingTextBoxFlag xmlns="" xmlns:m="http://schemas.openxmlformats.org/officeDocument/2006/math" xmlns:a14="http://schemas.microsoft.com/office/drawing/2010/main" xmlns:ma14="http://schemas.microsoft.com/office/mac/drawingml/2011/main" val="1"/>
+              <ma14:wrappingTextBoxFlag xmlns:ma14="http://schemas.microsoft.com/office/mac/drawingml/2011/main" xmlns:a14="http://schemas.microsoft.com/office/drawing/2010/main" xmlns:m="http://schemas.openxmlformats.org/officeDocument/2006/math" xmlns="" val="1"/>
             </a:ext>
           </a:extLst>
         </p:spPr>
@@ -10020,7 +10000,7 @@
           <a:effectLst/>
           <a:extLst>
             <a:ext uri="{C572A759-6A51-4108-AA02-DFA0A04FC94B}">
-              <ma14:wrappingTextBoxFlag xmlns="" xmlns:m="http://schemas.openxmlformats.org/officeDocument/2006/math" xmlns:a14="http://schemas.microsoft.com/office/drawing/2010/main" xmlns:ma14="http://schemas.microsoft.com/office/mac/drawingml/2011/main" val="1"/>
+              <ma14:wrappingTextBoxFlag xmlns:ma14="http://schemas.microsoft.com/office/mac/drawingml/2011/main" xmlns:a14="http://schemas.microsoft.com/office/drawing/2010/main" xmlns:m="http://schemas.openxmlformats.org/officeDocument/2006/math" xmlns="" val="1"/>
             </a:ext>
           </a:extLst>
         </p:spPr>
@@ -10168,7 +10148,7 @@
           </a:ln>
           <a:extLst>
             <a:ext uri="{C572A759-6A51-4108-AA02-DFA0A04FC94B}">
-              <ma14:wrappingTextBoxFlag xmlns="" xmlns:m="http://schemas.openxmlformats.org/officeDocument/2006/math" xmlns:a14="http://schemas.microsoft.com/office/drawing/2010/main" xmlns:ma14="http://schemas.microsoft.com/office/mac/drawingml/2011/main" val="1"/>
+              <ma14:wrappingTextBoxFlag xmlns:ma14="http://schemas.microsoft.com/office/mac/drawingml/2011/main" xmlns:a14="http://schemas.microsoft.com/office/drawing/2010/main" xmlns:m="http://schemas.openxmlformats.org/officeDocument/2006/math" xmlns="" val="1"/>
             </a:ext>
           </a:extLst>
         </p:spPr>
@@ -10349,7 +10329,7 @@
           </a:ln>
           <a:extLst>
             <a:ext uri="{C572A759-6A51-4108-AA02-DFA0A04FC94B}">
-              <ma14:wrappingTextBoxFlag xmlns="" xmlns:m="http://schemas.openxmlformats.org/officeDocument/2006/math" xmlns:a14="http://schemas.microsoft.com/office/drawing/2010/main" xmlns:ma14="http://schemas.microsoft.com/office/mac/drawingml/2011/main" val="1"/>
+              <ma14:wrappingTextBoxFlag xmlns:ma14="http://schemas.microsoft.com/office/mac/drawingml/2011/main" xmlns:a14="http://schemas.microsoft.com/office/drawing/2010/main" xmlns:m="http://schemas.openxmlformats.org/officeDocument/2006/math" xmlns="" val="1"/>
             </a:ext>
           </a:extLst>
         </p:spPr>
@@ -10530,7 +10510,7 @@
           </a:ln>
           <a:extLst>
             <a:ext uri="{C572A759-6A51-4108-AA02-DFA0A04FC94B}">
-              <ma14:wrappingTextBoxFlag xmlns="" xmlns:m="http://schemas.openxmlformats.org/officeDocument/2006/math" xmlns:a14="http://schemas.microsoft.com/office/drawing/2010/main" xmlns:ma14="http://schemas.microsoft.com/office/mac/drawingml/2011/main" val="1"/>
+              <ma14:wrappingTextBoxFlag xmlns:ma14="http://schemas.microsoft.com/office/mac/drawingml/2011/main" xmlns:a14="http://schemas.microsoft.com/office/drawing/2010/main" xmlns:m="http://schemas.openxmlformats.org/officeDocument/2006/math" xmlns="" val="1"/>
             </a:ext>
           </a:extLst>
         </p:spPr>
@@ -11424,7 +11404,7 @@
           <a:effectLst/>
           <a:extLst>
             <a:ext uri="{C572A759-6A51-4108-AA02-DFA0A04FC94B}">
-              <ma14:wrappingTextBoxFlag xmlns="" xmlns:m="http://schemas.openxmlformats.org/officeDocument/2006/math" xmlns:a14="http://schemas.microsoft.com/office/drawing/2010/main" xmlns:ma14="http://schemas.microsoft.com/office/mac/drawingml/2011/main" val="1"/>
+              <ma14:wrappingTextBoxFlag xmlns:ma14="http://schemas.microsoft.com/office/mac/drawingml/2011/main" xmlns:a14="http://schemas.microsoft.com/office/drawing/2010/main" xmlns:m="http://schemas.openxmlformats.org/officeDocument/2006/math" xmlns="" val="1"/>
             </a:ext>
           </a:extLst>
         </p:spPr>
@@ -11484,7 +11464,7 @@
           <a:effectLst/>
           <a:extLst>
             <a:ext uri="{C572A759-6A51-4108-AA02-DFA0A04FC94B}">
-              <ma14:wrappingTextBoxFlag xmlns="" xmlns:m="http://schemas.openxmlformats.org/officeDocument/2006/math" xmlns:a14="http://schemas.microsoft.com/office/drawing/2010/main" xmlns:ma14="http://schemas.microsoft.com/office/mac/drawingml/2011/main" val="1"/>
+              <ma14:wrappingTextBoxFlag xmlns:ma14="http://schemas.microsoft.com/office/mac/drawingml/2011/main" xmlns:a14="http://schemas.microsoft.com/office/drawing/2010/main" xmlns:m="http://schemas.openxmlformats.org/officeDocument/2006/math" xmlns="" val="1"/>
             </a:ext>
           </a:extLst>
         </p:spPr>
@@ -11544,7 +11524,7 @@
           <a:effectLst/>
           <a:extLst>
             <a:ext uri="{C572A759-6A51-4108-AA02-DFA0A04FC94B}">
-              <ma14:wrappingTextBoxFlag xmlns="" xmlns:m="http://schemas.openxmlformats.org/officeDocument/2006/math" xmlns:a14="http://schemas.microsoft.com/office/drawing/2010/main" xmlns:ma14="http://schemas.microsoft.com/office/mac/drawingml/2011/main" val="1"/>
+              <ma14:wrappingTextBoxFlag xmlns:ma14="http://schemas.microsoft.com/office/mac/drawingml/2011/main" xmlns:a14="http://schemas.microsoft.com/office/drawing/2010/main" xmlns:m="http://schemas.openxmlformats.org/officeDocument/2006/math" xmlns="" val="1"/>
             </a:ext>
           </a:extLst>
         </p:spPr>
@@ -11703,7 +11683,7 @@
           </a:ln>
           <a:extLst>
             <a:ext uri="{C572A759-6A51-4108-AA02-DFA0A04FC94B}">
-              <ma14:wrappingTextBoxFlag xmlns="" xmlns:m="http://schemas.openxmlformats.org/officeDocument/2006/math" xmlns:a14="http://schemas.microsoft.com/office/drawing/2010/main" xmlns:ma14="http://schemas.microsoft.com/office/mac/drawingml/2011/main" val="1"/>
+              <ma14:wrappingTextBoxFlag xmlns:ma14="http://schemas.microsoft.com/office/mac/drawingml/2011/main" xmlns:a14="http://schemas.microsoft.com/office/drawing/2010/main" xmlns:m="http://schemas.openxmlformats.org/officeDocument/2006/math" xmlns="" val="1"/>
             </a:ext>
           </a:extLst>
         </p:spPr>
@@ -11766,7 +11746,7 @@
           </a:ln>
           <a:extLst>
             <a:ext uri="{C572A759-6A51-4108-AA02-DFA0A04FC94B}">
-              <ma14:wrappingTextBoxFlag xmlns="" xmlns:m="http://schemas.openxmlformats.org/officeDocument/2006/math" xmlns:a14="http://schemas.microsoft.com/office/drawing/2010/main" xmlns:ma14="http://schemas.microsoft.com/office/mac/drawingml/2011/main" val="1"/>
+              <ma14:wrappingTextBoxFlag xmlns:ma14="http://schemas.microsoft.com/office/mac/drawingml/2011/main" xmlns:a14="http://schemas.microsoft.com/office/drawing/2010/main" xmlns:m="http://schemas.openxmlformats.org/officeDocument/2006/math" xmlns="" val="1"/>
             </a:ext>
           </a:extLst>
         </p:spPr>
@@ -11822,7 +11802,7 @@
           </a:ln>
           <a:extLst>
             <a:ext uri="{C572A759-6A51-4108-AA02-DFA0A04FC94B}">
-              <ma14:wrappingTextBoxFlag xmlns="" xmlns:m="http://schemas.openxmlformats.org/officeDocument/2006/math" xmlns:a14="http://schemas.microsoft.com/office/drawing/2010/main" xmlns:ma14="http://schemas.microsoft.com/office/mac/drawingml/2011/main" val="1"/>
+              <ma14:wrappingTextBoxFlag xmlns:ma14="http://schemas.microsoft.com/office/mac/drawingml/2011/main" xmlns:a14="http://schemas.microsoft.com/office/drawing/2010/main" xmlns:m="http://schemas.openxmlformats.org/officeDocument/2006/math" xmlns="" val="1"/>
             </a:ext>
           </a:extLst>
         </p:spPr>
@@ -11889,7 +11869,7 @@
           <a:effectLst/>
           <a:extLst>
             <a:ext uri="{C572A759-6A51-4108-AA02-DFA0A04FC94B}">
-              <ma14:wrappingTextBoxFlag xmlns="" xmlns:m="http://schemas.openxmlformats.org/officeDocument/2006/math" xmlns:a14="http://schemas.microsoft.com/office/drawing/2010/main" xmlns:ma14="http://schemas.microsoft.com/office/mac/drawingml/2011/main" val="1"/>
+              <ma14:wrappingTextBoxFlag xmlns:ma14="http://schemas.microsoft.com/office/mac/drawingml/2011/main" xmlns:a14="http://schemas.microsoft.com/office/drawing/2010/main" xmlns:m="http://schemas.openxmlformats.org/officeDocument/2006/math" xmlns="" val="1"/>
             </a:ext>
           </a:extLst>
         </p:spPr>
@@ -11949,7 +11929,7 @@
           <a:effectLst/>
           <a:extLst>
             <a:ext uri="{C572A759-6A51-4108-AA02-DFA0A04FC94B}">
-              <ma14:wrappingTextBoxFlag xmlns="" xmlns:m="http://schemas.openxmlformats.org/officeDocument/2006/math" xmlns:a14="http://schemas.microsoft.com/office/drawing/2010/main" xmlns:ma14="http://schemas.microsoft.com/office/mac/drawingml/2011/main" val="1"/>
+              <ma14:wrappingTextBoxFlag xmlns:ma14="http://schemas.microsoft.com/office/mac/drawingml/2011/main" xmlns:a14="http://schemas.microsoft.com/office/drawing/2010/main" xmlns:m="http://schemas.openxmlformats.org/officeDocument/2006/math" xmlns="" val="1"/>
             </a:ext>
           </a:extLst>
         </p:spPr>
@@ -12157,7 +12137,7 @@
           <a:effectLst/>
           <a:extLst>
             <a:ext uri="{C572A759-6A51-4108-AA02-DFA0A04FC94B}">
-              <ma14:wrappingTextBoxFlag xmlns="" xmlns:m="http://schemas.openxmlformats.org/officeDocument/2006/math" xmlns:a14="http://schemas.microsoft.com/office/drawing/2010/main" xmlns:ma14="http://schemas.microsoft.com/office/mac/drawingml/2011/main" val="1"/>
+              <ma14:wrappingTextBoxFlag xmlns:ma14="http://schemas.microsoft.com/office/mac/drawingml/2011/main" xmlns:a14="http://schemas.microsoft.com/office/drawing/2010/main" xmlns:m="http://schemas.openxmlformats.org/officeDocument/2006/math" xmlns="" val="1"/>
             </a:ext>
           </a:extLst>
         </p:spPr>
@@ -12462,7 +12442,7 @@
           </a:ln>
           <a:extLst>
             <a:ext uri="{C572A759-6A51-4108-AA02-DFA0A04FC94B}">
-              <ma14:wrappingTextBoxFlag xmlns="" xmlns:m="http://schemas.openxmlformats.org/officeDocument/2006/math" xmlns:a14="http://schemas.microsoft.com/office/drawing/2010/main" xmlns:ma14="http://schemas.microsoft.com/office/mac/drawingml/2011/main" val="1"/>
+              <ma14:wrappingTextBoxFlag xmlns:ma14="http://schemas.microsoft.com/office/mac/drawingml/2011/main" xmlns:a14="http://schemas.microsoft.com/office/drawing/2010/main" xmlns:m="http://schemas.openxmlformats.org/officeDocument/2006/math" xmlns="" val="1"/>
             </a:ext>
           </a:extLst>
         </p:spPr>
@@ -12614,7 +12594,7 @@
           <a:effectLst/>
           <a:extLst>
             <a:ext uri="{C572A759-6A51-4108-AA02-DFA0A04FC94B}">
-              <ma14:wrappingTextBoxFlag xmlns="" xmlns:m="http://schemas.openxmlformats.org/officeDocument/2006/math" xmlns:a14="http://schemas.microsoft.com/office/drawing/2010/main" xmlns:ma14="http://schemas.microsoft.com/office/mac/drawingml/2011/main" val="1"/>
+              <ma14:wrappingTextBoxFlag xmlns:ma14="http://schemas.microsoft.com/office/mac/drawingml/2011/main" xmlns:a14="http://schemas.microsoft.com/office/drawing/2010/main" xmlns:m="http://schemas.openxmlformats.org/officeDocument/2006/math" xmlns="" val="1"/>
             </a:ext>
           </a:extLst>
         </p:spPr>
@@ -13138,7 +13118,7 @@
           </a:ln>
           <a:extLst>
             <a:ext uri="{C572A759-6A51-4108-AA02-DFA0A04FC94B}">
-              <ma14:wrappingTextBoxFlag xmlns="" xmlns:m="http://schemas.openxmlformats.org/officeDocument/2006/math" xmlns:a14="http://schemas.microsoft.com/office/drawing/2010/main" xmlns:ma14="http://schemas.microsoft.com/office/mac/drawingml/2011/main" val="1"/>
+              <ma14:wrappingTextBoxFlag xmlns:ma14="http://schemas.microsoft.com/office/mac/drawingml/2011/main" xmlns:a14="http://schemas.microsoft.com/office/drawing/2010/main" xmlns:m="http://schemas.openxmlformats.org/officeDocument/2006/math" xmlns="" val="1"/>
             </a:ext>
           </a:extLst>
         </p:spPr>
@@ -13290,7 +13270,7 @@
           <a:effectLst/>
           <a:extLst>
             <a:ext uri="{C572A759-6A51-4108-AA02-DFA0A04FC94B}">
-              <ma14:wrappingTextBoxFlag xmlns="" xmlns:m="http://schemas.openxmlformats.org/officeDocument/2006/math" xmlns:a14="http://schemas.microsoft.com/office/drawing/2010/main" xmlns:ma14="http://schemas.microsoft.com/office/mac/drawingml/2011/main" val="1"/>
+              <ma14:wrappingTextBoxFlag xmlns:ma14="http://schemas.microsoft.com/office/mac/drawingml/2011/main" xmlns:a14="http://schemas.microsoft.com/office/drawing/2010/main" xmlns:m="http://schemas.openxmlformats.org/officeDocument/2006/math" xmlns="" val="1"/>
             </a:ext>
           </a:extLst>
         </p:spPr>
@@ -13362,7 +13342,7 @@
           </a:ln>
           <a:extLst>
             <a:ext uri="{C572A759-6A51-4108-AA02-DFA0A04FC94B}">
-              <ma14:wrappingTextBoxFlag xmlns="" xmlns:m="http://schemas.openxmlformats.org/officeDocument/2006/math" xmlns:a14="http://schemas.microsoft.com/office/drawing/2010/main" xmlns:ma14="http://schemas.microsoft.com/office/mac/drawingml/2011/main" val="1"/>
+              <ma14:wrappingTextBoxFlag xmlns:ma14="http://schemas.microsoft.com/office/mac/drawingml/2011/main" xmlns:a14="http://schemas.microsoft.com/office/drawing/2010/main" xmlns:m="http://schemas.openxmlformats.org/officeDocument/2006/math" xmlns="" val="1"/>
             </a:ext>
           </a:extLst>
         </p:spPr>
@@ -13538,7 +13518,7 @@
           <a:effectLst/>
           <a:extLst>
             <a:ext uri="{C572A759-6A51-4108-AA02-DFA0A04FC94B}">
-              <ma14:wrappingTextBoxFlag xmlns="" xmlns:m="http://schemas.openxmlformats.org/officeDocument/2006/math" xmlns:a14="http://schemas.microsoft.com/office/drawing/2010/main" xmlns:ma14="http://schemas.microsoft.com/office/mac/drawingml/2011/main" val="1"/>
+              <ma14:wrappingTextBoxFlag xmlns:ma14="http://schemas.microsoft.com/office/mac/drawingml/2011/main" xmlns:a14="http://schemas.microsoft.com/office/drawing/2010/main" xmlns:m="http://schemas.openxmlformats.org/officeDocument/2006/math" xmlns="" val="1"/>
             </a:ext>
           </a:extLst>
         </p:spPr>
@@ -13714,7 +13694,7 @@
           </a:ln>
           <a:extLst>
             <a:ext uri="{C572A759-6A51-4108-AA02-DFA0A04FC94B}">
-              <ma14:wrappingTextBoxFlag xmlns="" xmlns:m="http://schemas.openxmlformats.org/officeDocument/2006/math" xmlns:a14="http://schemas.microsoft.com/office/drawing/2010/main" xmlns:ma14="http://schemas.microsoft.com/office/mac/drawingml/2011/main" val="1"/>
+              <ma14:wrappingTextBoxFlag xmlns:ma14="http://schemas.microsoft.com/office/mac/drawingml/2011/main" xmlns:a14="http://schemas.microsoft.com/office/drawing/2010/main" xmlns:m="http://schemas.openxmlformats.org/officeDocument/2006/math" xmlns="" val="1"/>
             </a:ext>
           </a:extLst>
         </p:spPr>
@@ -13781,7 +13761,7 @@
           <a:effectLst/>
           <a:extLst>
             <a:ext uri="{C572A759-6A51-4108-AA02-DFA0A04FC94B}">
-              <ma14:wrappingTextBoxFlag xmlns="" xmlns:m="http://schemas.openxmlformats.org/officeDocument/2006/math" xmlns:a14="http://schemas.microsoft.com/office/drawing/2010/main" xmlns:ma14="http://schemas.microsoft.com/office/mac/drawingml/2011/main" val="1"/>
+              <ma14:wrappingTextBoxFlag xmlns:ma14="http://schemas.microsoft.com/office/mac/drawingml/2011/main" xmlns:a14="http://schemas.microsoft.com/office/drawing/2010/main" xmlns:m="http://schemas.openxmlformats.org/officeDocument/2006/math" xmlns="" val="1"/>
             </a:ext>
           </a:extLst>
         </p:spPr>
@@ -13841,7 +13821,7 @@
           <a:effectLst/>
           <a:extLst>
             <a:ext uri="{C572A759-6A51-4108-AA02-DFA0A04FC94B}">
-              <ma14:wrappingTextBoxFlag xmlns="" xmlns:m="http://schemas.openxmlformats.org/officeDocument/2006/math" xmlns:a14="http://schemas.microsoft.com/office/drawing/2010/main" xmlns:ma14="http://schemas.microsoft.com/office/mac/drawingml/2011/main" val="1"/>
+              <ma14:wrappingTextBoxFlag xmlns:ma14="http://schemas.microsoft.com/office/mac/drawingml/2011/main" xmlns:a14="http://schemas.microsoft.com/office/drawing/2010/main" xmlns:m="http://schemas.openxmlformats.org/officeDocument/2006/math" xmlns="" val="1"/>
             </a:ext>
           </a:extLst>
         </p:spPr>
@@ -14101,7 +14081,7 @@
           </a:ln>
           <a:extLst>
             <a:ext uri="{C572A759-6A51-4108-AA02-DFA0A04FC94B}">
-              <ma14:wrappingTextBoxFlag xmlns="" xmlns:m="http://schemas.openxmlformats.org/officeDocument/2006/math" xmlns:a14="http://schemas.microsoft.com/office/drawing/2010/main" xmlns:ma14="http://schemas.microsoft.com/office/mac/drawingml/2011/main" val="1"/>
+              <ma14:wrappingTextBoxFlag xmlns:ma14="http://schemas.microsoft.com/office/mac/drawingml/2011/main" xmlns:a14="http://schemas.microsoft.com/office/drawing/2010/main" xmlns:m="http://schemas.openxmlformats.org/officeDocument/2006/math" xmlns="" val="1"/>
             </a:ext>
           </a:extLst>
         </p:spPr>
@@ -15543,7 +15523,7 @@
           </a:ln>
           <a:extLst>
             <a:ext uri="{C572A759-6A51-4108-AA02-DFA0A04FC94B}">
-              <ma14:wrappingTextBoxFlag xmlns:ma14="http://schemas.microsoft.com/office/mac/drawingml/2011/main" xmlns:a14="http://schemas.microsoft.com/office/drawing/2010/main" xmlns:m="http://schemas.openxmlformats.org/officeDocument/2006/math" xmlns="" val="1"/>
+              <ma14:wrappingTextBoxFlag xmlns="" xmlns:m="http://schemas.openxmlformats.org/officeDocument/2006/math" xmlns:a14="http://schemas.microsoft.com/office/drawing/2010/main" xmlns:ma14="http://schemas.microsoft.com/office/mac/drawingml/2011/main" val="1"/>
             </a:ext>
           </a:extLst>
         </p:spPr>
@@ -17013,7 +16993,7 @@
               </a:ln>
               <a:extLst>
                 <a:ext uri="{C572A759-6A51-4108-AA02-DFA0A04FC94B}">
-                  <ma14:wrappingTextBoxFlag xmlns="" xmlns:m="http://schemas.openxmlformats.org/officeDocument/2006/math" xmlns:a14="http://schemas.microsoft.com/office/drawing/2010/main" xmlns:ma14="http://schemas.microsoft.com/office/mac/drawingml/2011/main" val="1"/>
+                  <ma14:wrappingTextBoxFlag xmlns:ma14="http://schemas.microsoft.com/office/mac/drawingml/2011/main" xmlns:a14="http://schemas.microsoft.com/office/drawing/2010/main" xmlns:m="http://schemas.openxmlformats.org/officeDocument/2006/math" xmlns="" val="1"/>
                 </a:ext>
               </a:extLst>
             </p:spPr>
@@ -17117,7 +17097,7 @@
               </a:ln>
               <a:extLst>
                 <a:ext uri="{C572A759-6A51-4108-AA02-DFA0A04FC94B}">
-                  <ma14:wrappingTextBoxFlag xmlns="" xmlns:m="http://schemas.openxmlformats.org/officeDocument/2006/math" xmlns:a14="http://schemas.microsoft.com/office/drawing/2010/main" xmlns:ma14="http://schemas.microsoft.com/office/mac/drawingml/2011/main" val="1"/>
+                  <ma14:wrappingTextBoxFlag xmlns:ma14="http://schemas.microsoft.com/office/mac/drawingml/2011/main" xmlns:a14="http://schemas.microsoft.com/office/drawing/2010/main" xmlns:m="http://schemas.openxmlformats.org/officeDocument/2006/math" xmlns="" val="1"/>
                 </a:ext>
               </a:extLst>
             </p:spPr>
@@ -18682,10 +18662,10 @@
                 <a:ea typeface="Open Sans" panose="020B0606030504020204" pitchFamily="34" charset="0"/>
                 <a:cs typeface="Open Sans" panose="020B0606030504020204" pitchFamily="34" charset="0"/>
               </a:rPr>
-              <a:t>     - Ya </a:t>
-            </a:r>
-            <a:r>
-              <a:rPr lang="es-ES" sz="1000" dirty="0" err="1">
+              <a:t>     - Ya transpilados a </a:t>
+            </a:r>
+            <a:r>
+              <a:rPr lang="es-ES" sz="1000" b="1" dirty="0" err="1">
                 <a:solidFill>
                   <a:schemeClr val="tx1">
                     <a:lumMod val="85000"/>
@@ -18696,10 +18676,10 @@
                 <a:ea typeface="Open Sans" panose="020B0606030504020204" pitchFamily="34" charset="0"/>
                 <a:cs typeface="Open Sans" panose="020B0606030504020204" pitchFamily="34" charset="0"/>
               </a:rPr>
-              <a:t>transpilados</a:t>
-            </a:r>
-            <a:r>
-              <a:rPr lang="es-ES" sz="1000" dirty="0">
+              <a:t>vanilla</a:t>
+            </a:r>
+            <a:r>
+              <a:rPr lang="es-ES" sz="1000" b="1" dirty="0">
                 <a:solidFill>
                   <a:schemeClr val="tx1">
                     <a:lumMod val="85000"/>
@@ -18710,10 +18690,13 @@
                 <a:ea typeface="Open Sans" panose="020B0606030504020204" pitchFamily="34" charset="0"/>
                 <a:cs typeface="Open Sans" panose="020B0606030504020204" pitchFamily="34" charset="0"/>
               </a:rPr>
-              <a:t> a </a:t>
-            </a:r>
-            <a:r>
-              <a:rPr lang="es-ES" sz="1000" b="1" dirty="0" err="1">
+              <a:t> JS</a:t>
+            </a:r>
+          </a:p>
+          <a:p>
+            <a:pPr lvl="1" indent="0"/>
+            <a:r>
+              <a:rPr lang="es-ES" sz="1000" b="1" dirty="0">
                 <a:solidFill>
                   <a:schemeClr val="tx1">
                     <a:lumMod val="85000"/>
@@ -18724,10 +18707,10 @@
                 <a:ea typeface="Open Sans" panose="020B0606030504020204" pitchFamily="34" charset="0"/>
                 <a:cs typeface="Open Sans" panose="020B0606030504020204" pitchFamily="34" charset="0"/>
               </a:rPr>
-              <a:t>vanilla</a:t>
-            </a:r>
-            <a:r>
-              <a:rPr lang="es-ES" sz="1000" b="1" dirty="0">
+              <a:t>     </a:t>
+            </a:r>
+            <a:r>
+              <a:rPr lang="es-ES" sz="1000" dirty="0">
                 <a:solidFill>
                   <a:schemeClr val="tx1">
                     <a:lumMod val="85000"/>
@@ -18738,13 +18721,10 @@
                 <a:ea typeface="Open Sans" panose="020B0606030504020204" pitchFamily="34" charset="0"/>
                 <a:cs typeface="Open Sans" panose="020B0606030504020204" pitchFamily="34" charset="0"/>
               </a:rPr>
-              <a:t> JS</a:t>
-            </a:r>
-          </a:p>
-          <a:p>
-            <a:pPr lvl="1" indent="0"/>
-            <a:r>
-              <a:rPr lang="es-ES" sz="1000" b="1" dirty="0">
+              <a:t>- Variedad de formatos (UMD, </a:t>
+            </a:r>
+            <a:r>
+              <a:rPr lang="es-ES" sz="1000" dirty="0" err="1">
                 <a:solidFill>
                   <a:schemeClr val="tx1">
                     <a:lumMod val="85000"/>
@@ -18755,7 +18735,7 @@
                 <a:ea typeface="Open Sans" panose="020B0606030504020204" pitchFamily="34" charset="0"/>
                 <a:cs typeface="Open Sans" panose="020B0606030504020204" pitchFamily="34" charset="0"/>
               </a:rPr>
-              <a:t>     </a:t>
+              <a:t>CommonJS</a:t>
             </a:r>
             <a:r>
               <a:rPr lang="es-ES" sz="1000" dirty="0">
@@ -18769,10 +18749,16 @@
                 <a:ea typeface="Open Sans" panose="020B0606030504020204" pitchFamily="34" charset="0"/>
                 <a:cs typeface="Open Sans" panose="020B0606030504020204" pitchFamily="34" charset="0"/>
               </a:rPr>
-              <a:t>- Variedad de formatos (UMD, </a:t>
-            </a:r>
-            <a:r>
-              <a:rPr lang="es-ES" sz="1000" dirty="0" err="1">
+              <a:t>).</a:t>
+            </a:r>
+          </a:p>
+          <a:p>
+            <a:pPr marL="171450" lvl="2" indent="-171450">
+              <a:buFont typeface="Wingdings" panose="05000000000000000000" pitchFamily="2" charset="2"/>
+              <a:buChar char="§"/>
+            </a:pPr>
+            <a:r>
+              <a:rPr lang="es-ES" sz="1000" dirty="0">
                 <a:solidFill>
                   <a:schemeClr val="tx1">
                     <a:lumMod val="85000"/>
@@ -18783,44 +18769,10 @@
                 <a:ea typeface="Open Sans" panose="020B0606030504020204" pitchFamily="34" charset="0"/>
                 <a:cs typeface="Open Sans" panose="020B0606030504020204" pitchFamily="34" charset="0"/>
               </a:rPr>
-              <a:t>CommonJS</a:t>
-            </a:r>
-            <a:r>
-              <a:rPr lang="es-ES" sz="1000" dirty="0">
-                <a:solidFill>
-                  <a:schemeClr val="tx1">
-                    <a:lumMod val="85000"/>
-                    <a:lumOff val="15000"/>
-                  </a:schemeClr>
-                </a:solidFill>
-                <a:latin typeface="Open Sans" panose="020B0606030504020204" pitchFamily="34" charset="0"/>
-                <a:ea typeface="Open Sans" panose="020B0606030504020204" pitchFamily="34" charset="0"/>
-                <a:cs typeface="Open Sans" panose="020B0606030504020204" pitchFamily="34" charset="0"/>
-              </a:rPr>
-              <a:t>).</a:t>
-            </a:r>
-          </a:p>
-          <a:p>
-            <a:pPr marL="171450" lvl="2" indent="-171450">
-              <a:buFont typeface="Wingdings" panose="05000000000000000000" pitchFamily="2" charset="2"/>
-              <a:buChar char="§"/>
-            </a:pPr>
-            <a:r>
-              <a:rPr lang="es-ES" sz="1000" dirty="0">
-                <a:solidFill>
-                  <a:schemeClr val="tx1">
-                    <a:lumMod val="85000"/>
-                    <a:lumOff val="15000"/>
-                  </a:schemeClr>
-                </a:solidFill>
-                <a:latin typeface="Open Sans" panose="020B0606030504020204" pitchFamily="34" charset="0"/>
-                <a:ea typeface="Open Sans" panose="020B0606030504020204" pitchFamily="34" charset="0"/>
-                <a:cs typeface="Open Sans" panose="020B0606030504020204" pitchFamily="34" charset="0"/>
-              </a:rPr>
               <a:t>Vite aplica </a:t>
             </a:r>
             <a:r>
-              <a:rPr lang="es-ES" sz="1000" dirty="0" err="1">
+              <a:rPr lang="es-ES" sz="1000" i="1" dirty="0" err="1">
                 <a:solidFill>
                   <a:schemeClr val="tx1">
                     <a:lumMod val="85000"/>
@@ -19134,8 +19086,8 @@
               <a:t>     - </a:t>
             </a:r>
             <a:r>
-              <a:rPr lang="es-ES" dirty="0" err="1"/>
-              <a:t>Sintáxis</a:t>
+              <a:rPr lang="es-ES" u="sng" dirty="0"/>
+              <a:t>Sintaxis</a:t>
             </a:r>
             <a:r>
               <a:rPr lang="es-ES" dirty="0"/>
@@ -20479,7 +20431,7 @@
             </a:ln>
             <a:extLst>
               <a:ext uri="{C572A759-6A51-4108-AA02-DFA0A04FC94B}">
-                <ma14:wrappingTextBoxFlag xmlns:ma14="http://schemas.microsoft.com/office/mac/drawingml/2011/main" xmlns:a14="http://schemas.microsoft.com/office/drawing/2010/main" xmlns:m="http://schemas.openxmlformats.org/officeDocument/2006/math" xmlns="" val="1"/>
+                <ma14:wrappingTextBoxFlag xmlns="" xmlns:m="http://schemas.openxmlformats.org/officeDocument/2006/math" xmlns:a14="http://schemas.microsoft.com/office/drawing/2010/main" xmlns:ma14="http://schemas.microsoft.com/office/mac/drawingml/2011/main" val="1"/>
               </a:ext>
             </a:extLst>
           </p:spPr>
@@ -20560,7 +20512,7 @@
             </a:ln>
             <a:extLst>
               <a:ext uri="{C572A759-6A51-4108-AA02-DFA0A04FC94B}">
-                <ma14:wrappingTextBoxFlag xmlns:ma14="http://schemas.microsoft.com/office/mac/drawingml/2011/main" xmlns:a14="http://schemas.microsoft.com/office/drawing/2010/main" xmlns:m="http://schemas.openxmlformats.org/officeDocument/2006/math" xmlns="" val="1"/>
+                <ma14:wrappingTextBoxFlag xmlns="" xmlns:m="http://schemas.openxmlformats.org/officeDocument/2006/math" xmlns:a14="http://schemas.microsoft.com/office/drawing/2010/main" xmlns:ma14="http://schemas.microsoft.com/office/mac/drawingml/2011/main" val="1"/>
               </a:ext>
             </a:extLst>
           </p:spPr>
@@ -21039,7 +20991,7 @@
               </a:ln>
               <a:extLst>
                 <a:ext uri="{C572A759-6A51-4108-AA02-DFA0A04FC94B}">
-                  <ma14:wrappingTextBoxFlag xmlns:ma14="http://schemas.microsoft.com/office/mac/drawingml/2011/main" xmlns:a14="http://schemas.microsoft.com/office/drawing/2010/main" xmlns:m="http://schemas.openxmlformats.org/officeDocument/2006/math" xmlns="" val="1"/>
+                  <ma14:wrappingTextBoxFlag xmlns="" xmlns:m="http://schemas.openxmlformats.org/officeDocument/2006/math" xmlns:a14="http://schemas.microsoft.com/office/drawing/2010/main" xmlns:ma14="http://schemas.microsoft.com/office/mac/drawingml/2011/main" val="1"/>
                 </a:ext>
               </a:extLst>
             </p:spPr>
@@ -21158,7 +21110,7 @@
           </a:ln>
           <a:extLst>
             <a:ext uri="{C572A759-6A51-4108-AA02-DFA0A04FC94B}">
-              <ma14:wrappingTextBoxFlag xmlns="" xmlns:m="http://schemas.openxmlformats.org/officeDocument/2006/math" xmlns:a14="http://schemas.microsoft.com/office/drawing/2010/main" xmlns:ma14="http://schemas.microsoft.com/office/mac/drawingml/2011/main" val="1"/>
+              <ma14:wrappingTextBoxFlag xmlns:ma14="http://schemas.microsoft.com/office/mac/drawingml/2011/main" xmlns:a14="http://schemas.microsoft.com/office/drawing/2010/main" xmlns:m="http://schemas.openxmlformats.org/officeDocument/2006/math" xmlns="" val="1"/>
             </a:ext>
           </a:extLst>
         </p:spPr>
@@ -21453,7 +21405,7 @@
           <a:effectLst/>
           <a:extLst>
             <a:ext uri="{C572A759-6A51-4108-AA02-DFA0A04FC94B}">
-              <ma14:wrappingTextBoxFlag xmlns="" xmlns:m="http://schemas.openxmlformats.org/officeDocument/2006/math" xmlns:a14="http://schemas.microsoft.com/office/drawing/2010/main" xmlns:ma14="http://schemas.microsoft.com/office/mac/drawingml/2011/main" val="1"/>
+              <ma14:wrappingTextBoxFlag xmlns:ma14="http://schemas.microsoft.com/office/mac/drawingml/2011/main" xmlns:a14="http://schemas.microsoft.com/office/drawing/2010/main" xmlns:m="http://schemas.openxmlformats.org/officeDocument/2006/math" xmlns="" val="1"/>
             </a:ext>
           </a:extLst>
         </p:spPr>
@@ -21607,10 +21559,10 @@
                 <a:ea typeface="Open Sans" panose="020B0606030504020204" pitchFamily="34" charset="0"/>
                 <a:cs typeface="Open Sans" panose="020B0606030504020204" pitchFamily="34" charset="0"/>
               </a:rPr>
-              <a:t> nativo (</a:t>
-            </a:r>
-            <a:r>
-              <a:rPr lang="es-ES" sz="1200" dirty="0" err="1">
+              <a:t> nativo </a:t>
+            </a:r>
+            <a:r>
+              <a:rPr lang="es-ES" sz="1200">
                 <a:solidFill>
                   <a:schemeClr val="tx1">
                     <a:lumMod val="85000"/>
@@ -21621,7 +21573,7 @@
                 <a:ea typeface="Open Sans" panose="020B0606030504020204" pitchFamily="34" charset="0"/>
                 <a:cs typeface="Open Sans" panose="020B0606030504020204" pitchFamily="34" charset="0"/>
               </a:rPr>
-              <a:t>sintáxis</a:t>
+              <a:t>(sintaxis </a:t>
             </a:r>
             <a:r>
               <a:rPr lang="es-ES" sz="1200" dirty="0">
@@ -21635,7 +21587,7 @@
                 <a:ea typeface="Open Sans" panose="020B0606030504020204" pitchFamily="34" charset="0"/>
                 <a:cs typeface="Open Sans" panose="020B0606030504020204" pitchFamily="34" charset="0"/>
               </a:rPr>
-              <a:t> de </a:t>
+              <a:t>de </a:t>
             </a:r>
             <a:r>
               <a:rPr lang="es-ES" sz="1200" dirty="0" err="1">
@@ -22223,7 +22175,7 @@
           <a:effectLst/>
           <a:extLst>
             <a:ext uri="{C572A759-6A51-4108-AA02-DFA0A04FC94B}">
-              <ma14:wrappingTextBoxFlag xmlns="" xmlns:m="http://schemas.openxmlformats.org/officeDocument/2006/math" xmlns:a14="http://schemas.microsoft.com/office/drawing/2010/main" xmlns:ma14="http://schemas.microsoft.com/office/mac/drawingml/2011/main" val="1"/>
+              <ma14:wrappingTextBoxFlag xmlns:ma14="http://schemas.microsoft.com/office/mac/drawingml/2011/main" xmlns:a14="http://schemas.microsoft.com/office/drawing/2010/main" xmlns:m="http://schemas.openxmlformats.org/officeDocument/2006/math" xmlns="" val="1"/>
             </a:ext>
           </a:extLst>
         </p:spPr>
@@ -22437,7 +22389,7 @@
                 <a:ea typeface="Open Sans" panose="020B0606030504020204" pitchFamily="34" charset="0"/>
                 <a:cs typeface="Open Sans" panose="020B0606030504020204" pitchFamily="34" charset="0"/>
               </a:rPr>
-              <a:t>Los módulos nativos de ECMAScript requieren navegadores compatibles</a:t>
+              <a:t>Los módulos nativos de ECMAScript, así como ciertas sintaxis específicas de estos, requieren navegadores compatibles</a:t>
             </a:r>
           </a:p>
           <a:p>
@@ -22450,7 +22402,7 @@
               </a:buBlip>
             </a:pPr>
             <a:r>
-              <a:rPr lang="es-ES" sz="1200" dirty="0">
+              <a:rPr lang="es-ES" sz="1200" b="1" dirty="0" err="1">
                 <a:solidFill>
                   <a:schemeClr val="tx1">
                     <a:lumMod val="85000"/>
@@ -22461,10 +22413,10 @@
                 <a:ea typeface="Open Sans" panose="020B0606030504020204" pitchFamily="34" charset="0"/>
                 <a:cs typeface="Open Sans" panose="020B0606030504020204" pitchFamily="34" charset="0"/>
               </a:rPr>
-              <a:t>Es </a:t>
-            </a:r>
-            <a:r>
-              <a:rPr lang="es-ES" sz="1200" b="1" dirty="0" err="1">
+              <a:t>Isolated</a:t>
+            </a:r>
+            <a:r>
+              <a:rPr lang="es-ES" sz="1200" b="1" dirty="0">
                 <a:solidFill>
                   <a:schemeClr val="tx1">
                     <a:lumMod val="85000"/>
@@ -22475,19 +22427,8 @@
                 <a:ea typeface="Open Sans" panose="020B0606030504020204" pitchFamily="34" charset="0"/>
                 <a:cs typeface="Open Sans" panose="020B0606030504020204" pitchFamily="34" charset="0"/>
               </a:rPr>
-              <a:t>opinionado</a:t>
-            </a:r>
-            <a:endParaRPr lang="es-ES" sz="1200" b="1" dirty="0">
-              <a:solidFill>
-                <a:schemeClr val="tx1">
-                  <a:lumMod val="85000"/>
-                  <a:lumOff val="15000"/>
-                </a:schemeClr>
-              </a:solidFill>
-              <a:latin typeface="Open Sans" panose="020B0606030504020204" pitchFamily="34" charset="0"/>
-              <a:ea typeface="Open Sans" panose="020B0606030504020204" pitchFamily="34" charset="0"/>
-              <a:cs typeface="Open Sans" panose="020B0606030504020204" pitchFamily="34" charset="0"/>
-            </a:endParaRPr>
+              <a:t> modules</a:t>
+            </a:r>
           </a:p>
           <a:p>
             <a:pPr>
@@ -22507,66 +22448,10 @@
                 <a:ea typeface="Open Sans" panose="020B0606030504020204" pitchFamily="34" charset="0"/>
                 <a:cs typeface="Open Sans" panose="020B0606030504020204" pitchFamily="34" charset="0"/>
               </a:rPr>
-              <a:t>Sintaxis específicas, por un lado son útiles pero por otro te acoplas a Vite</a:t>
-            </a:r>
-            <a:endParaRPr lang="es-ES" sz="1200" dirty="0">
-              <a:solidFill>
-                <a:schemeClr val="tx1">
-                  <a:lumMod val="85000"/>
-                  <a:lumOff val="15000"/>
-                </a:schemeClr>
-              </a:solidFill>
-              <a:latin typeface="Open Sans" panose="020B0606030504020204" pitchFamily="34" charset="0"/>
-              <a:ea typeface="Open Sans" panose="020B0606030504020204" pitchFamily="34" charset="0"/>
-              <a:cs typeface="Open Sans" panose="020B0606030504020204" pitchFamily="34" charset="0"/>
-            </a:endParaRPr>
-          </a:p>
-          <a:p>
-            <a:pPr marL="171450" indent="-171450">
-              <a:spcBef>
-                <a:spcPts val="600"/>
-              </a:spcBef>
-              <a:buBlip>
-                <a:blip r:embed="rId4"/>
-              </a:buBlip>
-            </a:pPr>
-            <a:r>
-              <a:rPr lang="es-ES" sz="1200" b="1" dirty="0" err="1">
-                <a:solidFill>
-                  <a:schemeClr val="tx1">
-                    <a:lumMod val="85000"/>
-                    <a:lumOff val="15000"/>
-                  </a:schemeClr>
-                </a:solidFill>
-                <a:latin typeface="Open Sans" panose="020B0606030504020204" pitchFamily="34" charset="0"/>
-                <a:ea typeface="Open Sans" panose="020B0606030504020204" pitchFamily="34" charset="0"/>
-                <a:cs typeface="Open Sans" panose="020B0606030504020204" pitchFamily="34" charset="0"/>
-              </a:rPr>
-              <a:t>Isolated</a:t>
-            </a:r>
-            <a:r>
-              <a:rPr lang="es-ES" sz="1200" b="1" dirty="0">
-                <a:solidFill>
-                  <a:schemeClr val="tx1">
-                    <a:lumMod val="85000"/>
-                    <a:lumOff val="15000"/>
-                  </a:schemeClr>
-                </a:solidFill>
-                <a:latin typeface="Open Sans" panose="020B0606030504020204" pitchFamily="34" charset="0"/>
-                <a:ea typeface="Open Sans" panose="020B0606030504020204" pitchFamily="34" charset="0"/>
-                <a:cs typeface="Open Sans" panose="020B0606030504020204" pitchFamily="34" charset="0"/>
-              </a:rPr>
-              <a:t> modules</a:t>
-            </a:r>
-          </a:p>
-          <a:p>
-            <a:pPr>
-              <a:spcBef>
-                <a:spcPts val="600"/>
-              </a:spcBef>
-            </a:pPr>
-            <a:r>
-              <a:rPr lang="es-ES" sz="1200" dirty="0">
+              <a:t>Soporta TS </a:t>
+            </a:r>
+            <a:r>
+              <a:rPr lang="es-ES" sz="1200" i="1" dirty="0" err="1">
                 <a:solidFill>
                   <a:schemeClr val="tx1">
                     <a:lumMod val="50000"/>
@@ -22577,10 +22462,10 @@
                 <a:ea typeface="Open Sans" panose="020B0606030504020204" pitchFamily="34" charset="0"/>
                 <a:cs typeface="Open Sans" panose="020B0606030504020204" pitchFamily="34" charset="0"/>
               </a:rPr>
-              <a:t>Soporta TS </a:t>
-            </a:r>
-            <a:r>
-              <a:rPr lang="es-ES" sz="1200" dirty="0" err="1">
+              <a:t>out</a:t>
+            </a:r>
+            <a:r>
+              <a:rPr lang="es-ES" sz="1200" i="1" dirty="0">
                 <a:solidFill>
                   <a:schemeClr val="tx1">
                     <a:lumMod val="50000"/>
@@ -22591,10 +22476,10 @@
                 <a:ea typeface="Open Sans" panose="020B0606030504020204" pitchFamily="34" charset="0"/>
                 <a:cs typeface="Open Sans" panose="020B0606030504020204" pitchFamily="34" charset="0"/>
               </a:rPr>
-              <a:t>out</a:t>
-            </a:r>
-            <a:r>
-              <a:rPr lang="es-ES" sz="1200" dirty="0">
+              <a:t> </a:t>
+            </a:r>
+            <a:r>
+              <a:rPr lang="es-ES" sz="1200" i="1" dirty="0" err="1">
                 <a:solidFill>
                   <a:schemeClr val="tx1">
                     <a:lumMod val="50000"/>
@@ -22605,10 +22490,10 @@
                 <a:ea typeface="Open Sans" panose="020B0606030504020204" pitchFamily="34" charset="0"/>
                 <a:cs typeface="Open Sans" panose="020B0606030504020204" pitchFamily="34" charset="0"/>
               </a:rPr>
-              <a:t> </a:t>
-            </a:r>
-            <a:r>
-              <a:rPr lang="es-ES" sz="1200" dirty="0" err="1">
+              <a:t>of</a:t>
+            </a:r>
+            <a:r>
+              <a:rPr lang="es-ES" sz="1200" i="1" dirty="0">
                 <a:solidFill>
                   <a:schemeClr val="tx1">
                     <a:lumMod val="50000"/>
@@ -22619,10 +22504,10 @@
                 <a:ea typeface="Open Sans" panose="020B0606030504020204" pitchFamily="34" charset="0"/>
                 <a:cs typeface="Open Sans" panose="020B0606030504020204" pitchFamily="34" charset="0"/>
               </a:rPr>
-              <a:t>of</a:t>
-            </a:r>
-            <a:r>
-              <a:rPr lang="es-ES" sz="1200" dirty="0">
+              <a:t> </a:t>
+            </a:r>
+            <a:r>
+              <a:rPr lang="es-ES" sz="1200" i="1" dirty="0" err="1">
                 <a:solidFill>
                   <a:schemeClr val="tx1">
                     <a:lumMod val="50000"/>
@@ -22633,10 +22518,10 @@
                 <a:ea typeface="Open Sans" panose="020B0606030504020204" pitchFamily="34" charset="0"/>
                 <a:cs typeface="Open Sans" panose="020B0606030504020204" pitchFamily="34" charset="0"/>
               </a:rPr>
-              <a:t> </a:t>
-            </a:r>
-            <a:r>
-              <a:rPr lang="es-ES" sz="1200" dirty="0" err="1">
+              <a:t>the</a:t>
+            </a:r>
+            <a:r>
+              <a:rPr lang="es-ES" sz="1200" i="1" dirty="0">
                 <a:solidFill>
                   <a:schemeClr val="tx1">
                     <a:lumMod val="50000"/>
@@ -22647,7 +22532,7 @@
                 <a:ea typeface="Open Sans" panose="020B0606030504020204" pitchFamily="34" charset="0"/>
                 <a:cs typeface="Open Sans" panose="020B0606030504020204" pitchFamily="34" charset="0"/>
               </a:rPr>
-              <a:t>the</a:t>
+              <a:t> box</a:t>
             </a:r>
             <a:r>
               <a:rPr lang="es-ES" sz="1200" dirty="0">
@@ -22661,7 +22546,7 @@
                 <a:ea typeface="Open Sans" panose="020B0606030504020204" pitchFamily="34" charset="0"/>
                 <a:cs typeface="Open Sans" panose="020B0606030504020204" pitchFamily="34" charset="0"/>
               </a:rPr>
-              <a:t> box pero en modo </a:t>
+              <a:t> pero en modo </a:t>
             </a:r>
             <a:r>
               <a:rPr lang="es-ES" sz="1200" dirty="0" err="1">
@@ -22858,7 +22743,7 @@
           </a:ln>
           <a:extLst>
             <a:ext uri="{C572A759-6A51-4108-AA02-DFA0A04FC94B}">
-              <ma14:wrappingTextBoxFlag xmlns:ma14="http://schemas.microsoft.com/office/mac/drawingml/2011/main" xmlns:a14="http://schemas.microsoft.com/office/drawing/2010/main" xmlns:m="http://schemas.openxmlformats.org/officeDocument/2006/math" xmlns="" val="1"/>
+              <ma14:wrappingTextBoxFlag xmlns="" xmlns:m="http://schemas.openxmlformats.org/officeDocument/2006/math" xmlns:a14="http://schemas.microsoft.com/office/drawing/2010/main" xmlns:ma14="http://schemas.microsoft.com/office/mac/drawingml/2011/main" val="1"/>
             </a:ext>
           </a:extLst>
         </p:spPr>
@@ -22920,7 +22805,7 @@
           </a:ln>
           <a:extLst>
             <a:ext uri="{C572A759-6A51-4108-AA02-DFA0A04FC94B}">
-              <ma14:wrappingTextBoxFlag xmlns:ma14="http://schemas.microsoft.com/office/mac/drawingml/2011/main" xmlns:a14="http://schemas.microsoft.com/office/drawing/2010/main" xmlns:m="http://schemas.openxmlformats.org/officeDocument/2006/math" xmlns="" val="1"/>
+              <ma14:wrappingTextBoxFlag xmlns="" xmlns:m="http://schemas.openxmlformats.org/officeDocument/2006/math" xmlns:a14="http://schemas.microsoft.com/office/drawing/2010/main" xmlns:ma14="http://schemas.microsoft.com/office/mac/drawingml/2011/main" val="1"/>
             </a:ext>
           </a:extLst>
         </p:spPr>
@@ -23072,7 +22957,7 @@
           </a:ln>
           <a:extLst>
             <a:ext uri="{C572A759-6A51-4108-AA02-DFA0A04FC94B}">
-              <ma14:wrappingTextBoxFlag xmlns:ma14="http://schemas.microsoft.com/office/mac/drawingml/2011/main" xmlns:a14="http://schemas.microsoft.com/office/drawing/2010/main" xmlns:m="http://schemas.openxmlformats.org/officeDocument/2006/math" xmlns="" val="1"/>
+              <ma14:wrappingTextBoxFlag xmlns="" xmlns:m="http://schemas.openxmlformats.org/officeDocument/2006/math" xmlns:a14="http://schemas.microsoft.com/office/drawing/2010/main" xmlns:ma14="http://schemas.microsoft.com/office/mac/drawingml/2011/main" val="1"/>
             </a:ext>
           </a:extLst>
         </p:spPr>
@@ -23251,7 +23136,7 @@
           </a:ln>
           <a:extLst>
             <a:ext uri="{C572A759-6A51-4108-AA02-DFA0A04FC94B}">
-              <ma14:wrappingTextBoxFlag xmlns:ma14="http://schemas.microsoft.com/office/mac/drawingml/2011/main" xmlns:a14="http://schemas.microsoft.com/office/drawing/2010/main" xmlns:m="http://schemas.openxmlformats.org/officeDocument/2006/math" xmlns="" val="1"/>
+              <ma14:wrappingTextBoxFlag xmlns="" xmlns:m="http://schemas.openxmlformats.org/officeDocument/2006/math" xmlns:a14="http://schemas.microsoft.com/office/drawing/2010/main" xmlns:ma14="http://schemas.microsoft.com/office/mac/drawingml/2011/main" val="1"/>
             </a:ext>
           </a:extLst>
         </p:spPr>

</xml_diff>